<commit_message>
chg: Adjusted image for Use Case
</commit_message>
<xml_diff>
--- a/docs/use_case.pptx
+++ b/docs/use_case.pptx
@@ -3624,7 +3624,7 @@
         <p:spPr>
           <a:xfrm>
             <a:off x="3025801" y="2005311"/>
-            <a:ext cx="1236891" cy="261610"/>
+            <a:ext cx="1236891" cy="246221"/>
           </a:xfrm>
           <a:prstGeom prst="rect">
             <a:avLst/>
@@ -3638,13 +3638,13 @@
           <a:lstStyle/>
           <a:p>
             <a:r>
-              <a:rPr lang="en-US" sz="1050" b="1" dirty="0">
+              <a:rPr lang="en-US" sz="1000" b="1" dirty="0">
                 <a:solidFill>
                   <a:schemeClr val="bg1"/>
                 </a:solidFill>
                 <a:latin typeface="Avenir Book" panose="02000503020000020003" pitchFamily="2" charset="0"/>
               </a:rPr>
-              <a:t> Application</a:t>
+              <a:t>  Application</a:t>
             </a:r>
           </a:p>
         </p:txBody>
@@ -3988,7 +3988,7 @@
         <p:spPr>
           <a:xfrm>
             <a:off x="1070128" y="2005311"/>
-            <a:ext cx="1236891" cy="261610"/>
+            <a:ext cx="1236891" cy="246221"/>
           </a:xfrm>
           <a:prstGeom prst="rect">
             <a:avLst/>
@@ -4002,13 +4002,13 @@
           <a:lstStyle/>
           <a:p>
             <a:r>
-              <a:rPr lang="en-US" sz="1050" b="1" dirty="0">
+              <a:rPr lang="en-US" sz="1000" b="1" dirty="0">
                 <a:solidFill>
                   <a:schemeClr val="bg1"/>
                 </a:solidFill>
                 <a:latin typeface="Avenir Book" panose="02000503020000020003" pitchFamily="2" charset="0"/>
               </a:rPr>
-              <a:t> Application</a:t>
+              <a:t>  Application</a:t>
             </a:r>
           </a:p>
         </p:txBody>
@@ -4171,10 +4171,10 @@
       </p:pic>
       <p:sp>
         <p:nvSpPr>
-          <p:cNvPr id="26" name="Rounded Rectangle 25">
-            <a:extLst>
-              <a:ext uri="{FF2B5EF4-FFF2-40B4-BE49-F238E27FC236}">
-                <a16:creationId xmlns:a16="http://schemas.microsoft.com/office/drawing/2014/main" id="{3346D4A4-F255-5F44-AF66-7E60041E2597}"/>
+          <p:cNvPr id="25" name="Rounded Rectangle 24">
+            <a:extLst>
+              <a:ext uri="{FF2B5EF4-FFF2-40B4-BE49-F238E27FC236}">
+                <a16:creationId xmlns:a16="http://schemas.microsoft.com/office/drawing/2014/main" id="{B44FDF9F-3A0C-8247-B079-E6EF9EE1EE09}"/>
               </a:ext>
             </a:extLst>
           </p:cNvPr>
@@ -4183,8 +4183,8 @@
         </p:nvSpPr>
         <p:spPr>
           <a:xfrm>
-            <a:off x="2505902" y="3972781"/>
-            <a:ext cx="328414" cy="161359"/>
+            <a:off x="2425148" y="3950341"/>
+            <a:ext cx="476098" cy="240632"/>
           </a:xfrm>
           <a:prstGeom prst="roundRect">
             <a:avLst>
@@ -4192,7 +4192,7 @@
             </a:avLst>
           </a:prstGeom>
           <a:solidFill>
-            <a:srgbClr val="FFC000"/>
+            <a:srgbClr val="F2B602"/>
           </a:solidFill>
           <a:ln>
             <a:noFill/>
@@ -4219,16 +4219,16 @@
           <a:lstStyle/>
           <a:p>
             <a:pPr algn="ctr"/>
-            <a:endParaRPr lang="en-US" sz="1400"/>
-          </a:p>
-        </p:txBody>
-      </p:sp>
-      <p:sp>
-        <p:nvSpPr>
-          <p:cNvPr id="28" name="TextBox 27">
-            <a:extLst>
-              <a:ext uri="{FF2B5EF4-FFF2-40B4-BE49-F238E27FC236}">
-                <a16:creationId xmlns:a16="http://schemas.microsoft.com/office/drawing/2014/main" id="{07A324CE-33B8-304A-85DF-87ECEBFF5B40}"/>
+            <a:endParaRPr lang="en-US"/>
+          </a:p>
+        </p:txBody>
+      </p:sp>
+      <p:sp>
+        <p:nvSpPr>
+          <p:cNvPr id="29" name="TextBox 28">
+            <a:extLst>
+              <a:ext uri="{FF2B5EF4-FFF2-40B4-BE49-F238E27FC236}">
+                <a16:creationId xmlns:a16="http://schemas.microsoft.com/office/drawing/2014/main" id="{466C3EC6-68B6-4345-A5AB-CBF73931D926}"/>
               </a:ext>
             </a:extLst>
           </p:cNvPr>
@@ -4237,8 +4237,8 @@
         </p:nvSpPr>
         <p:spPr>
           <a:xfrm>
-            <a:off x="2561820" y="3958076"/>
-            <a:ext cx="316674" cy="200055"/>
+            <a:off x="2578001" y="3949377"/>
+            <a:ext cx="386400" cy="246221"/>
           </a:xfrm>
           <a:prstGeom prst="rect">
             <a:avLst/>
@@ -4251,9 +4251,8 @@
           </a:bodyPr>
           <a:lstStyle/>
           <a:p>
-            <a:pPr algn="ctr"/>
-            <a:r>
-              <a:rPr lang="en-US" sz="700" b="1" dirty="0">
+            <a:r>
+              <a:rPr lang="en-US" sz="1000" b="1" dirty="0">
                 <a:solidFill>
                   <a:schemeClr val="bg1"/>
                 </a:solidFill>
@@ -4286,8 +4285,8 @@
         </p:blipFill>
         <p:spPr>
           <a:xfrm>
-            <a:off x="2547637" y="4008763"/>
-            <a:ext cx="101195" cy="88982"/>
+            <a:off x="2491809" y="4011256"/>
+            <a:ext cx="137092" cy="120547"/>
           </a:xfrm>
           <a:prstGeom prst="rect">
             <a:avLst/>

</xml_diff>